<commit_message>
Updated description of tokens in qgis3about.html
</commit_message>
<xml_diff>
--- a/about-html/Kortforsyningsplugin3_dansk.pptx
+++ b/about-html/Kortforsyningsplugin3_dansk.pptx
@@ -269,7 +269,7 @@
           <a:p>
             <a:fld id="{E941B69C-30E9-4528-AF1E-84C48F433A02}" type="datetimeFigureOut">
               <a:rPr lang="da-DK" smtClean="0"/>
-              <a:t>06-03-2019</a:t>
+              <a:t>13-03-2019</a:t>
             </a:fld>
             <a:endParaRPr lang="da-DK"/>
           </a:p>
@@ -469,7 +469,7 @@
           <a:p>
             <a:fld id="{E941B69C-30E9-4528-AF1E-84C48F433A02}" type="datetimeFigureOut">
               <a:rPr lang="da-DK" smtClean="0"/>
-              <a:t>06-03-2019</a:t>
+              <a:t>13-03-2019</a:t>
             </a:fld>
             <a:endParaRPr lang="da-DK"/>
           </a:p>
@@ -679,7 +679,7 @@
           <a:p>
             <a:fld id="{E941B69C-30E9-4528-AF1E-84C48F433A02}" type="datetimeFigureOut">
               <a:rPr lang="da-DK" smtClean="0"/>
-              <a:t>06-03-2019</a:t>
+              <a:t>13-03-2019</a:t>
             </a:fld>
             <a:endParaRPr lang="da-DK"/>
           </a:p>
@@ -879,7 +879,7 @@
           <a:p>
             <a:fld id="{E941B69C-30E9-4528-AF1E-84C48F433A02}" type="datetimeFigureOut">
               <a:rPr lang="da-DK" smtClean="0"/>
-              <a:t>06-03-2019</a:t>
+              <a:t>13-03-2019</a:t>
             </a:fld>
             <a:endParaRPr lang="da-DK"/>
           </a:p>
@@ -1155,7 +1155,7 @@
           <a:p>
             <a:fld id="{E941B69C-30E9-4528-AF1E-84C48F433A02}" type="datetimeFigureOut">
               <a:rPr lang="da-DK" smtClean="0"/>
-              <a:t>06-03-2019</a:t>
+              <a:t>13-03-2019</a:t>
             </a:fld>
             <a:endParaRPr lang="da-DK"/>
           </a:p>
@@ -1423,7 +1423,7 @@
           <a:p>
             <a:fld id="{E941B69C-30E9-4528-AF1E-84C48F433A02}" type="datetimeFigureOut">
               <a:rPr lang="da-DK" smtClean="0"/>
-              <a:t>06-03-2019</a:t>
+              <a:t>13-03-2019</a:t>
             </a:fld>
             <a:endParaRPr lang="da-DK"/>
           </a:p>
@@ -1838,7 +1838,7 @@
           <a:p>
             <a:fld id="{E941B69C-30E9-4528-AF1E-84C48F433A02}" type="datetimeFigureOut">
               <a:rPr lang="da-DK" smtClean="0"/>
-              <a:t>06-03-2019</a:t>
+              <a:t>13-03-2019</a:t>
             </a:fld>
             <a:endParaRPr lang="da-DK"/>
           </a:p>
@@ -1980,7 +1980,7 @@
           <a:p>
             <a:fld id="{E941B69C-30E9-4528-AF1E-84C48F433A02}" type="datetimeFigureOut">
               <a:rPr lang="da-DK" smtClean="0"/>
-              <a:t>06-03-2019</a:t>
+              <a:t>13-03-2019</a:t>
             </a:fld>
             <a:endParaRPr lang="da-DK"/>
           </a:p>
@@ -2093,7 +2093,7 @@
           <a:p>
             <a:fld id="{E941B69C-30E9-4528-AF1E-84C48F433A02}" type="datetimeFigureOut">
               <a:rPr lang="da-DK" smtClean="0"/>
-              <a:t>06-03-2019</a:t>
+              <a:t>13-03-2019</a:t>
             </a:fld>
             <a:endParaRPr lang="da-DK"/>
           </a:p>
@@ -2406,7 +2406,7 @@
           <a:p>
             <a:fld id="{E941B69C-30E9-4528-AF1E-84C48F433A02}" type="datetimeFigureOut">
               <a:rPr lang="da-DK" smtClean="0"/>
-              <a:t>06-03-2019</a:t>
+              <a:t>13-03-2019</a:t>
             </a:fld>
             <a:endParaRPr lang="da-DK"/>
           </a:p>
@@ -2695,7 +2695,7 @@
           <a:p>
             <a:fld id="{E941B69C-30E9-4528-AF1E-84C48F433A02}" type="datetimeFigureOut">
               <a:rPr lang="da-DK" smtClean="0"/>
-              <a:t>06-03-2019</a:t>
+              <a:t>13-03-2019</a:t>
             </a:fld>
             <a:endParaRPr lang="da-DK"/>
           </a:p>
@@ -2938,7 +2938,7 @@
           <a:p>
             <a:fld id="{E941B69C-30E9-4528-AF1E-84C48F433A02}" type="datetimeFigureOut">
               <a:rPr lang="da-DK" smtClean="0"/>
-              <a:t>06-03-2019</a:t>
+              <a:t>13-03-2019</a:t>
             </a:fld>
             <a:endParaRPr lang="da-DK"/>
           </a:p>
@@ -3387,10 +3387,10 @@
       </p:pic>
       <p:pic>
         <p:nvPicPr>
-          <p:cNvPr id="5" name="Picture 4">
-            <a:extLst>
-              <a:ext uri="{FF2B5EF4-FFF2-40B4-BE49-F238E27FC236}">
-                <a16:creationId xmlns:a16="http://schemas.microsoft.com/office/drawing/2014/main" id="{D2016BA4-C505-4618-BC36-F9F3EFECD703}"/>
+          <p:cNvPr id="3" name="Picture 2">
+            <a:extLst>
+              <a:ext uri="{FF2B5EF4-FFF2-40B4-BE49-F238E27FC236}">
+                <a16:creationId xmlns:a16="http://schemas.microsoft.com/office/drawing/2014/main" id="{E46A59B6-A392-4DF0-820F-728DA6B48337}"/>
               </a:ext>
             </a:extLst>
           </p:cNvPr>
@@ -3407,8 +3407,8 @@
         </p:blipFill>
         <p:spPr>
           <a:xfrm>
-            <a:off x="1601164" y="1551396"/>
-            <a:ext cx="5681462" cy="4577137"/>
+            <a:off x="1601169" y="1497495"/>
+            <a:ext cx="5441382" cy="5135217"/>
           </a:xfrm>
           <a:prstGeom prst="rect">
             <a:avLst/>

</xml_diff>